<commit_message>
edit slide format on page 7.
</commit_message>
<xml_diff>
--- a/gitBranch.pptx
+++ b/gitBranch.pptx
@@ -280,7 +280,7 @@
               <a:pPr>
                 <a:defRPr/>
               </a:pPr>
-              <a:t>2017/3/13</a:t>
+              <a:t>2020/5/20</a:t>
             </a:fld>
             <a:endParaRPr lang="zh-TW" altLang="en-US"/>
           </a:p>
@@ -1228,7 +1228,7 @@
               <a:pPr>
                 <a:defRPr/>
               </a:pPr>
-              <a:t>2017/3/13</a:t>
+              <a:t>2020/5/20</a:t>
             </a:fld>
             <a:endParaRPr lang="zh-TW" altLang="en-US"/>
           </a:p>
@@ -1420,7 +1420,7 @@
               <a:pPr>
                 <a:defRPr/>
               </a:pPr>
-              <a:t>2017/3/13</a:t>
+              <a:t>2020/5/20</a:t>
             </a:fld>
             <a:endParaRPr lang="zh-TW" altLang="en-US"/>
           </a:p>
@@ -1622,7 +1622,7 @@
               <a:pPr>
                 <a:defRPr/>
               </a:pPr>
-              <a:t>2017/3/13</a:t>
+              <a:t>2020/5/20</a:t>
             </a:fld>
             <a:endParaRPr lang="zh-TW" altLang="en-US"/>
           </a:p>
@@ -1762,7 +1762,7 @@
               <a:pPr>
                 <a:defRPr/>
               </a:pPr>
-              <a:t>2017/3/13</a:t>
+              <a:t>2020/5/20</a:t>
             </a:fld>
             <a:endParaRPr lang="zh-TW" altLang="en-US"/>
           </a:p>
@@ -1974,7 +1974,7 @@
               <a:pPr>
                 <a:defRPr/>
               </a:pPr>
-              <a:t>2017/3/13</a:t>
+              <a:t>2020/5/20</a:t>
             </a:fld>
             <a:endParaRPr lang="en-US" altLang="zh-TW"/>
           </a:p>
@@ -2172,7 +2172,7 @@
               <a:pPr>
                 <a:defRPr/>
               </a:pPr>
-              <a:t>2017/3/13</a:t>
+              <a:t>2020/5/20</a:t>
             </a:fld>
             <a:endParaRPr lang="en-US" altLang="zh-TW"/>
           </a:p>
@@ -2392,7 +2392,7 @@
               <a:pPr>
                 <a:defRPr/>
               </a:pPr>
-              <a:t>2017/3/13</a:t>
+              <a:t>2020/5/20</a:t>
             </a:fld>
             <a:endParaRPr lang="en-US" altLang="zh-TW"/>
           </a:p>
@@ -2708,7 +2708,7 @@
               <a:pPr>
                 <a:defRPr/>
               </a:pPr>
-              <a:t>2017/3/13</a:t>
+              <a:t>2020/5/20</a:t>
             </a:fld>
             <a:endParaRPr lang="en-US" altLang="zh-TW"/>
           </a:p>
@@ -3163,7 +3163,7 @@
               <a:pPr>
                 <a:defRPr/>
               </a:pPr>
-              <a:t>2017/3/13</a:t>
+              <a:t>2020/5/20</a:t>
             </a:fld>
             <a:endParaRPr lang="en-US" altLang="zh-TW"/>
           </a:p>
@@ -3309,7 +3309,7 @@
               <a:pPr>
                 <a:defRPr/>
               </a:pPr>
-              <a:t>2017/3/13</a:t>
+              <a:t>2020/5/20</a:t>
             </a:fld>
             <a:endParaRPr lang="en-US" altLang="zh-TW"/>
           </a:p>
@@ -3432,7 +3432,7 @@
               <a:pPr>
                 <a:defRPr/>
               </a:pPr>
-              <a:t>2017/3/13</a:t>
+              <a:t>2020/5/20</a:t>
             </a:fld>
             <a:endParaRPr lang="en-US" altLang="zh-TW"/>
           </a:p>
@@ -3628,7 +3628,7 @@
               <a:pPr>
                 <a:defRPr/>
               </a:pPr>
-              <a:t>2017/3/13</a:t>
+              <a:t>2020/5/20</a:t>
             </a:fld>
             <a:endParaRPr lang="zh-TW" altLang="en-US"/>
           </a:p>
@@ -3929,7 +3929,7 @@
               <a:pPr>
                 <a:defRPr/>
               </a:pPr>
-              <a:t>2017/3/13</a:t>
+              <a:t>2020/5/20</a:t>
             </a:fld>
             <a:endParaRPr lang="en-US" altLang="zh-TW"/>
           </a:p>
@@ -4211,7 +4211,7 @@
               <a:pPr>
                 <a:defRPr/>
               </a:pPr>
-              <a:t>2017/3/13</a:t>
+              <a:t>2020/5/20</a:t>
             </a:fld>
             <a:endParaRPr lang="en-US" altLang="zh-TW"/>
           </a:p>
@@ -4409,7 +4409,7 @@
               <a:pPr>
                 <a:defRPr/>
               </a:pPr>
-              <a:t>2017/3/13</a:t>
+              <a:t>2020/5/20</a:t>
             </a:fld>
             <a:endParaRPr lang="en-US" altLang="zh-TW"/>
           </a:p>
@@ -4617,7 +4617,7 @@
               <a:pPr>
                 <a:defRPr/>
               </a:pPr>
-              <a:t>2017/3/13</a:t>
+              <a:t>2020/5/20</a:t>
             </a:fld>
             <a:endParaRPr lang="en-US" altLang="zh-TW"/>
           </a:p>
@@ -4763,7 +4763,7 @@
               <a:pPr>
                 <a:defRPr/>
               </a:pPr>
-              <a:t>2017/3/13</a:t>
+              <a:t>2020/5/20</a:t>
             </a:fld>
             <a:endParaRPr lang="en-US" altLang="zh-TW"/>
           </a:p>
@@ -5031,7 +5031,7 @@
               <a:pPr>
                 <a:defRPr/>
               </a:pPr>
-              <a:t>2017/3/13</a:t>
+              <a:t>2020/5/20</a:t>
             </a:fld>
             <a:endParaRPr lang="zh-TW" altLang="en-US"/>
           </a:p>
@@ -5223,7 +5223,7 @@
               <a:pPr>
                 <a:defRPr/>
               </a:pPr>
-              <a:t>2017/3/13</a:t>
+              <a:t>2020/5/20</a:t>
             </a:fld>
             <a:endParaRPr lang="zh-TW" altLang="en-US"/>
           </a:p>
@@ -5491,7 +5491,7 @@
               <a:pPr>
                 <a:defRPr/>
               </a:pPr>
-              <a:t>2017/3/13</a:t>
+              <a:t>2020/5/20</a:t>
             </a:fld>
             <a:endParaRPr lang="zh-TW" altLang="en-US"/>
           </a:p>
@@ -5801,7 +5801,7 @@
               <a:pPr>
                 <a:defRPr/>
               </a:pPr>
-              <a:t>2017/3/13</a:t>
+              <a:t>2020/5/20</a:t>
             </a:fld>
             <a:endParaRPr lang="zh-TW" altLang="en-US"/>
           </a:p>
@@ -6245,7 +6245,7 @@
               <a:pPr>
                 <a:defRPr/>
               </a:pPr>
-              <a:t>2017/3/13</a:t>
+              <a:t>2020/5/20</a:t>
             </a:fld>
             <a:endParaRPr lang="zh-TW" altLang="en-US"/>
           </a:p>
@@ -6513,7 +6513,7 @@
               <a:pPr>
                 <a:defRPr/>
               </a:pPr>
-              <a:t>2017/3/13</a:t>
+              <a:t>2020/5/20</a:t>
             </a:fld>
             <a:endParaRPr lang="zh-TW" altLang="en-US"/>
           </a:p>
@@ -6653,7 +6653,7 @@
               <a:pPr>
                 <a:defRPr/>
               </a:pPr>
-              <a:t>2017/3/13</a:t>
+              <a:t>2020/5/20</a:t>
             </a:fld>
             <a:endParaRPr lang="zh-TW" altLang="en-US"/>
           </a:p>
@@ -6770,7 +6770,7 @@
               <a:pPr>
                 <a:defRPr/>
               </a:pPr>
-              <a:t>2017/3/13</a:t>
+              <a:t>2020/5/20</a:t>
             </a:fld>
             <a:endParaRPr lang="zh-TW" altLang="en-US"/>
           </a:p>
@@ -7069,7 +7069,7 @@
               <a:pPr>
                 <a:defRPr/>
               </a:pPr>
-              <a:t>2017/3/13</a:t>
+              <a:t>2020/5/20</a:t>
             </a:fld>
             <a:endParaRPr lang="zh-TW" altLang="en-US"/>
           </a:p>
@@ -7347,7 +7347,7 @@
               <a:pPr>
                 <a:defRPr/>
               </a:pPr>
-              <a:t>2017/3/13</a:t>
+              <a:t>2020/5/20</a:t>
             </a:fld>
             <a:endParaRPr lang="zh-TW" altLang="en-US"/>
           </a:p>
@@ -7539,7 +7539,7 @@
               <a:pPr>
                 <a:defRPr/>
               </a:pPr>
-              <a:t>2017/3/13</a:t>
+              <a:t>2020/5/20</a:t>
             </a:fld>
             <a:endParaRPr lang="zh-TW" altLang="en-US"/>
           </a:p>
@@ -7741,7 +7741,7 @@
               <a:pPr>
                 <a:defRPr/>
               </a:pPr>
-              <a:t>2017/3/13</a:t>
+              <a:t>2020/5/20</a:t>
             </a:fld>
             <a:endParaRPr lang="zh-TW" altLang="en-US"/>
           </a:p>
@@ -8051,7 +8051,7 @@
               <a:pPr>
                 <a:defRPr/>
               </a:pPr>
-              <a:t>2017/3/13</a:t>
+              <a:t>2020/5/20</a:t>
             </a:fld>
             <a:endParaRPr lang="zh-TW" altLang="en-US"/>
           </a:p>
@@ -8495,7 +8495,7 @@
               <a:pPr>
                 <a:defRPr/>
               </a:pPr>
-              <a:t>2017/3/13</a:t>
+              <a:t>2020/5/20</a:t>
             </a:fld>
             <a:endParaRPr lang="zh-TW" altLang="en-US"/>
           </a:p>
@@ -8635,7 +8635,7 @@
               <a:pPr>
                 <a:defRPr/>
               </a:pPr>
-              <a:t>2017/3/13</a:t>
+              <a:t>2020/5/20</a:t>
             </a:fld>
             <a:endParaRPr lang="zh-TW" altLang="en-US"/>
           </a:p>
@@ -9257,7 +9257,7 @@
               <a:pPr>
                 <a:defRPr/>
               </a:pPr>
-              <a:t>2017/3/13</a:t>
+              <a:t>2020/5/20</a:t>
             </a:fld>
             <a:endParaRPr lang="zh-TW" altLang="en-US"/>
           </a:p>
@@ -9556,7 +9556,7 @@
               <a:pPr>
                 <a:defRPr/>
               </a:pPr>
-              <a:t>2017/3/13</a:t>
+              <a:t>2020/5/20</a:t>
             </a:fld>
             <a:endParaRPr lang="zh-TW" altLang="en-US"/>
           </a:p>
@@ -9834,7 +9834,7 @@
               <a:pPr>
                 <a:defRPr/>
               </a:pPr>
-              <a:t>2017/3/13</a:t>
+              <a:t>2020/5/20</a:t>
             </a:fld>
             <a:endParaRPr lang="zh-TW" altLang="en-US"/>
           </a:p>
@@ -10082,7 +10082,7 @@
               <a:pPr>
                 <a:defRPr/>
               </a:pPr>
-              <a:t>2017/3/13</a:t>
+              <a:t>2020/5/20</a:t>
             </a:fld>
             <a:endParaRPr lang="zh-TW" altLang="en-US"/>
           </a:p>
@@ -11190,7 +11190,7 @@
               <a:pPr>
                 <a:defRPr/>
               </a:pPr>
-              <a:t>2017/3/13</a:t>
+              <a:t>2020/5/20</a:t>
             </a:fld>
             <a:endParaRPr lang="en-US" altLang="zh-TW"/>
           </a:p>
@@ -11872,7 +11872,7 @@
               <a:pPr>
                 <a:defRPr/>
               </a:pPr>
-              <a:t>2017/3/13</a:t>
+              <a:t>2020/5/20</a:t>
             </a:fld>
             <a:endParaRPr lang="zh-TW" altLang="en-US"/>
           </a:p>
@@ -13774,7 +13774,7 @@
         </p:nvGraphicFramePr>
         <p:xfrm>
           <a:off x="457200" y="1600200"/>
-          <a:ext cx="8229600" cy="4525963"/>
+          <a:ext cx="8229600" cy="1483360"/>
         </p:xfrm>
         <a:graphic>
           <a:graphicData uri="http://schemas.openxmlformats.org/drawingml/2006/table">
@@ -15452,74 +15452,178 @@
           <a:bodyPr/>
           <a:lstStyle/>
           <a:p>
-            <a:r>
-              <a:rPr lang="en-US" altLang="zh-TW" sz="2200" dirty="0" smtClean="0"/>
+            <a:pPr marL="361950" indent="-361950" defTabSz="893763"/>
+            <a:r>
+              <a:rPr lang="en-US" altLang="zh-TW" sz="1800" dirty="0" smtClean="0"/>
               <a:t>May branch off from : </a:t>
             </a:r>
             <a:r>
-              <a:rPr lang="en-US" altLang="zh-TW" sz="2200" b="1" i="1" dirty="0" smtClean="0"/>
+              <a:rPr lang="en-US" altLang="zh-TW" sz="1800" b="1" i="1" dirty="0" smtClean="0"/>
               <a:t>develop</a:t>
             </a:r>
           </a:p>
           <a:p>
-            <a:r>
-              <a:rPr lang="en-US" altLang="zh-TW" sz="2200" dirty="0" smtClean="0"/>
+            <a:pPr marL="361950" indent="-361950" defTabSz="893763"/>
+            <a:r>
+              <a:rPr lang="en-US" altLang="zh-TW" sz="1800" dirty="0" smtClean="0"/>
               <a:t>Must merge back into: </a:t>
             </a:r>
             <a:r>
-              <a:rPr lang="en-US" altLang="zh-TW" sz="2200" b="1" i="1" dirty="0" smtClean="0"/>
+              <a:rPr lang="en-US" altLang="zh-TW" sz="1800" b="1" i="1" dirty="0" smtClean="0"/>
               <a:t>develop</a:t>
             </a:r>
             <a:r>
-              <a:rPr lang="en-US" altLang="zh-TW" sz="2200" b="1" dirty="0" smtClean="0"/>
+              <a:rPr lang="en-US" altLang="zh-TW" sz="1800" b="1" dirty="0" smtClean="0"/>
               <a:t> </a:t>
             </a:r>
-            <a:r>
-              <a:rPr lang="en-US" altLang="zh-TW" sz="2200" dirty="0" smtClean="0"/>
-              <a:t>and </a:t>
-            </a:r>
-            <a:r>
-              <a:rPr lang="en-US" altLang="zh-TW" sz="2200" b="1" i="1" dirty="0" smtClean="0"/>
+            <a:endParaRPr lang="en-US" altLang="zh-TW" sz="1800" b="1" dirty="0" smtClean="0"/>
+          </a:p>
+          <a:p>
+            <a:pPr marL="361950" indent="-361950" defTabSz="361950">
+              <a:buNone/>
+            </a:pPr>
+            <a:r>
+              <a:rPr lang="en-US" altLang="zh-TW" sz="1800" dirty="0" smtClean="0"/>
+              <a:t>	and </a:t>
+            </a:r>
+            <a:r>
+              <a:rPr lang="en-US" altLang="zh-TW" sz="1800" b="1" i="1" dirty="0" smtClean="0"/>
               <a:t>master</a:t>
             </a:r>
           </a:p>
           <a:p>
-            <a:r>
-              <a:rPr lang="en-US" altLang="zh-TW" sz="2200" dirty="0" smtClean="0"/>
+            <a:pPr marL="361950" indent="-361950" defTabSz="893763"/>
+            <a:r>
+              <a:rPr lang="en-US" altLang="zh-TW" sz="1800" dirty="0" smtClean="0"/>
               <a:t>Naming convention: </a:t>
             </a:r>
             <a:r>
-              <a:rPr lang="en-US" altLang="zh-TW" sz="2200" b="1" i="1" dirty="0" smtClean="0"/>
+              <a:rPr lang="en-US" altLang="zh-TW" sz="1800" b="1" i="1" dirty="0" smtClean="0"/>
               <a:t>release-*</a:t>
             </a:r>
           </a:p>
           <a:p>
-            <a:r>
-              <a:rPr lang="en-US" altLang="zh-TW" sz="2200" dirty="0" smtClean="0"/>
-              <a:t>A new release branch is created when the </a:t>
-            </a:r>
-            <a:r>
-              <a:rPr lang="en-US" altLang="zh-TW" sz="2200" b="1" i="1" dirty="0" smtClean="0"/>
+            <a:pPr marL="361950" indent="-361950" defTabSz="893763"/>
+            <a:r>
+              <a:rPr lang="en-US" altLang="zh-TW" sz="1800" dirty="0" smtClean="0"/>
+              <a:t>A new release branch is created </a:t>
+            </a:r>
+            <a:endParaRPr lang="en-US" altLang="zh-TW" sz="1800" dirty="0" smtClean="0"/>
+          </a:p>
+          <a:p>
+            <a:pPr marL="361950" indent="-361950" defTabSz="893763">
+              <a:buNone/>
+            </a:pPr>
+            <a:r>
+              <a:rPr lang="en-US" altLang="zh-TW" sz="1800" dirty="0" smtClean="0"/>
+              <a:t>	when </a:t>
+            </a:r>
+            <a:r>
+              <a:rPr lang="en-US" altLang="zh-TW" sz="1800" dirty="0" smtClean="0"/>
+              <a:t>the </a:t>
+            </a:r>
+            <a:r>
+              <a:rPr lang="en-US" altLang="zh-TW" sz="1800" b="1" i="1" dirty="0" smtClean="0"/>
               <a:t>develop</a:t>
             </a:r>
             <a:r>
-              <a:rPr lang="en-US" altLang="zh-TW" sz="2200" dirty="0" smtClean="0"/>
-              <a:t> is ready for release.</a:t>
-            </a:r>
-          </a:p>
-          <a:p>
-            <a:r>
-              <a:rPr lang="en-US" altLang="zh-TW" sz="2200" dirty="0" smtClean="0"/>
-              <a:t>Do the last-minute double check, fix minor bugs and prepare the meta-data for a release</a:t>
-            </a:r>
-          </a:p>
-          <a:p>
-            <a:r>
-              <a:rPr lang="en-US" altLang="zh-TW" sz="2200" dirty="0" smtClean="0"/>
-              <a:t>Develop branch stops to accept new features while the release branch is alive</a:t>
-            </a:r>
-          </a:p>
-          <a:p>
+              <a:rPr lang="en-US" altLang="zh-TW" sz="1800" dirty="0" smtClean="0"/>
+              <a:t> is ready for </a:t>
+            </a:r>
+            <a:endParaRPr lang="en-US" altLang="zh-TW" sz="1800" dirty="0" smtClean="0"/>
+          </a:p>
+          <a:p>
+            <a:pPr marL="361950" indent="-361950" defTabSz="893763">
+              <a:buNone/>
+            </a:pPr>
+            <a:r>
+              <a:rPr lang="en-US" altLang="zh-TW" sz="1800" dirty="0"/>
+              <a:t>	</a:t>
+            </a:r>
+            <a:r>
+              <a:rPr lang="en-US" altLang="zh-TW" sz="1800" dirty="0" smtClean="0"/>
+              <a:t>release</a:t>
+            </a:r>
+            <a:r>
+              <a:rPr lang="en-US" altLang="zh-TW" sz="1800" dirty="0" smtClean="0"/>
+              <a:t>.</a:t>
+            </a:r>
+          </a:p>
+          <a:p>
+            <a:pPr marL="361950" indent="-361950" defTabSz="893763"/>
+            <a:r>
+              <a:rPr lang="en-US" altLang="zh-TW" sz="1800" dirty="0" smtClean="0"/>
+              <a:t>Do the last-minute double check, </a:t>
+            </a:r>
+            <a:endParaRPr lang="en-US" altLang="zh-TW" sz="1800" dirty="0" smtClean="0"/>
+          </a:p>
+          <a:p>
+            <a:pPr marL="361950" indent="-361950" defTabSz="893763">
+              <a:buNone/>
+            </a:pPr>
+            <a:r>
+              <a:rPr lang="en-US" altLang="zh-TW" sz="1800" dirty="0" smtClean="0"/>
+              <a:t>	fix </a:t>
+            </a:r>
+            <a:r>
+              <a:rPr lang="en-US" altLang="zh-TW" sz="1800" dirty="0" smtClean="0"/>
+              <a:t>minor bugs and prepare the </a:t>
+            </a:r>
+            <a:endParaRPr lang="en-US" altLang="zh-TW" sz="1800" dirty="0" smtClean="0"/>
+          </a:p>
+          <a:p>
+            <a:pPr marL="361950" indent="-361950" defTabSz="893763">
+              <a:buNone/>
+            </a:pPr>
+            <a:r>
+              <a:rPr lang="en-US" altLang="zh-TW" sz="1800" dirty="0" smtClean="0"/>
+              <a:t>	meta-data </a:t>
+            </a:r>
+            <a:r>
+              <a:rPr lang="en-US" altLang="zh-TW" sz="1800" dirty="0" smtClean="0"/>
+              <a:t>for a release</a:t>
+            </a:r>
+          </a:p>
+          <a:p>
+            <a:pPr marL="361950" indent="-361950" defTabSz="893763"/>
+            <a:r>
+              <a:rPr lang="en-US" altLang="zh-TW" sz="1800" dirty="0" smtClean="0"/>
+              <a:t>Develop branch stops to accept </a:t>
+            </a:r>
+            <a:endParaRPr lang="en-US" altLang="zh-TW" sz="1800" dirty="0" smtClean="0"/>
+          </a:p>
+          <a:p>
+            <a:pPr marL="361950" indent="-361950" defTabSz="893763">
+              <a:buNone/>
+            </a:pPr>
+            <a:r>
+              <a:rPr lang="en-US" altLang="zh-TW" sz="1800" dirty="0" smtClean="0"/>
+              <a:t>	new </a:t>
+            </a:r>
+            <a:r>
+              <a:rPr lang="en-US" altLang="zh-TW" sz="1800" dirty="0" smtClean="0"/>
+              <a:t>features while the </a:t>
+            </a:r>
+            <a:r>
+              <a:rPr lang="en-US" altLang="zh-TW" sz="1800" dirty="0" smtClean="0"/>
+              <a:t>release</a:t>
+            </a:r>
+          </a:p>
+          <a:p>
+            <a:pPr marL="361950" indent="-361950" defTabSz="893763">
+              <a:buNone/>
+            </a:pPr>
+            <a:r>
+              <a:rPr lang="en-US" altLang="zh-TW" sz="1800" dirty="0" smtClean="0"/>
+              <a:t>	branch </a:t>
+            </a:r>
+            <a:r>
+              <a:rPr lang="en-US" altLang="zh-TW" sz="1800" dirty="0" smtClean="0"/>
+              <a:t>is alive</a:t>
+            </a:r>
+          </a:p>
+          <a:p>
+            <a:pPr marL="361950" indent="-361950" defTabSz="893763"/>
             <a:endParaRPr lang="zh-TW" altLang="en-US" sz="2400" dirty="0"/>
           </a:p>
         </p:txBody>
@@ -15542,8 +15646,8 @@
         </p:blipFill>
         <p:spPr bwMode="auto">
           <a:xfrm>
-            <a:off x="4648200" y="1992625"/>
-            <a:ext cx="4038600" cy="3741113"/>
+            <a:off x="4932040" y="1600200"/>
+            <a:ext cx="3894584" cy="4133537"/>
           </a:xfrm>
           <a:prstGeom prst="rect">
             <a:avLst/>

</xml_diff>